<commit_message>
Modulo 07, correção ortografica no slide. Modulo 10 aula criada por mim
</commit_message>
<xml_diff>
--- a/Módulo 07 - Criação de menus/Módulo VII - Criação de Menus.pptx
+++ b/Módulo 07 - Criação de menus/Módulo VII - Criação de Menus.pptx
@@ -27,12 +27,12 @@
       <p:boldItalic r:id="rId15"/>
     </p:embeddedFont>
     <p:embeddedFont>
-      <p:font typeface="Lato Bold" panose="020F0502020204030203" pitchFamily="34" charset="0"/>
+      <p:font typeface="Lato Bold" panose="020F0502020204030203" charset="0"/>
       <p:regular r:id="rId16"/>
       <p:bold r:id="rId17"/>
     </p:embeddedFont>
     <p:embeddedFont>
-      <p:font typeface="Poppins Bold" panose="00000800000000000000" pitchFamily="2" charset="0"/>
+      <p:font typeface="Poppins Bold" panose="020B0604020202020204" charset="0"/>
       <p:regular r:id="rId18"/>
       <p:bold r:id="rId19"/>
     </p:embeddedFont>
@@ -343,7 +343,7 @@
             <a:fld id="{1D8BD707-D9CF-40AE-B4C6-C98DA3205C09}" type="datetimeFigureOut">
               <a:rPr lang="en-US" smtClean="0"/>
               <a:pPr/>
-              <a:t>11/25/2024</a:t>
+              <a:t>12/2/2024</a:t>
             </a:fld>
             <a:endParaRPr lang="en-US"/>
           </a:p>
@@ -386,7 +386,7 @@
             <a:fld id="{B6F15528-21DE-4FAA-801E-634DDDAF4B2B}" type="slidenum">
               <a:rPr lang="en-US" smtClean="0"/>
               <a:pPr/>
-              <a:t>‹nº›</a:t>
+              <a:t>‹#›</a:t>
             </a:fld>
             <a:endParaRPr lang="en-US"/>
           </a:p>
@@ -508,7 +508,7 @@
             <a:fld id="{1D8BD707-D9CF-40AE-B4C6-C98DA3205C09}" type="datetimeFigureOut">
               <a:rPr lang="en-US" smtClean="0"/>
               <a:pPr/>
-              <a:t>11/25/2024</a:t>
+              <a:t>12/2/2024</a:t>
             </a:fld>
             <a:endParaRPr lang="en-US"/>
           </a:p>
@@ -551,7 +551,7 @@
             <a:fld id="{B6F15528-21DE-4FAA-801E-634DDDAF4B2B}" type="slidenum">
               <a:rPr lang="en-US" smtClean="0"/>
               <a:pPr/>
-              <a:t>‹nº›</a:t>
+              <a:t>‹#›</a:t>
             </a:fld>
             <a:endParaRPr lang="en-US"/>
           </a:p>
@@ -683,7 +683,7 @@
             <a:fld id="{1D8BD707-D9CF-40AE-B4C6-C98DA3205C09}" type="datetimeFigureOut">
               <a:rPr lang="en-US" smtClean="0"/>
               <a:pPr/>
-              <a:t>11/25/2024</a:t>
+              <a:t>12/2/2024</a:t>
             </a:fld>
             <a:endParaRPr lang="en-US"/>
           </a:p>
@@ -726,7 +726,7 @@
             <a:fld id="{B6F15528-21DE-4FAA-801E-634DDDAF4B2B}" type="slidenum">
               <a:rPr lang="en-US" smtClean="0"/>
               <a:pPr/>
-              <a:t>‹nº›</a:t>
+              <a:t>‹#›</a:t>
             </a:fld>
             <a:endParaRPr lang="en-US"/>
           </a:p>
@@ -848,7 +848,7 @@
             <a:fld id="{1D8BD707-D9CF-40AE-B4C6-C98DA3205C09}" type="datetimeFigureOut">
               <a:rPr lang="en-US" smtClean="0"/>
               <a:pPr/>
-              <a:t>11/25/2024</a:t>
+              <a:t>12/2/2024</a:t>
             </a:fld>
             <a:endParaRPr lang="en-US"/>
           </a:p>
@@ -891,7 +891,7 @@
             <a:fld id="{B6F15528-21DE-4FAA-801E-634DDDAF4B2B}" type="slidenum">
               <a:rPr lang="en-US" smtClean="0"/>
               <a:pPr/>
-              <a:t>‹nº›</a:t>
+              <a:t>‹#›</a:t>
             </a:fld>
             <a:endParaRPr lang="en-US"/>
           </a:p>
@@ -1090,7 +1090,7 @@
             <a:fld id="{1D8BD707-D9CF-40AE-B4C6-C98DA3205C09}" type="datetimeFigureOut">
               <a:rPr lang="en-US" smtClean="0"/>
               <a:pPr/>
-              <a:t>11/25/2024</a:t>
+              <a:t>12/2/2024</a:t>
             </a:fld>
             <a:endParaRPr lang="en-US"/>
           </a:p>
@@ -1133,7 +1133,7 @@
             <a:fld id="{B6F15528-21DE-4FAA-801E-634DDDAF4B2B}" type="slidenum">
               <a:rPr lang="en-US" smtClean="0"/>
               <a:pPr/>
-              <a:t>‹nº›</a:t>
+              <a:t>‹#›</a:t>
             </a:fld>
             <a:endParaRPr lang="en-US"/>
           </a:p>
@@ -1372,7 +1372,7 @@
             <a:fld id="{1D8BD707-D9CF-40AE-B4C6-C98DA3205C09}" type="datetimeFigureOut">
               <a:rPr lang="en-US" smtClean="0"/>
               <a:pPr/>
-              <a:t>11/25/2024</a:t>
+              <a:t>12/2/2024</a:t>
             </a:fld>
             <a:endParaRPr lang="en-US"/>
           </a:p>
@@ -1415,7 +1415,7 @@
             <a:fld id="{B6F15528-21DE-4FAA-801E-634DDDAF4B2B}" type="slidenum">
               <a:rPr lang="en-US" smtClean="0"/>
               <a:pPr/>
-              <a:t>‹nº›</a:t>
+              <a:t>‹#›</a:t>
             </a:fld>
             <a:endParaRPr lang="en-US"/>
           </a:p>
@@ -1788,7 +1788,7 @@
             <a:fld id="{1D8BD707-D9CF-40AE-B4C6-C98DA3205C09}" type="datetimeFigureOut">
               <a:rPr lang="en-US" smtClean="0"/>
               <a:pPr/>
-              <a:t>11/25/2024</a:t>
+              <a:t>12/2/2024</a:t>
             </a:fld>
             <a:endParaRPr lang="en-US"/>
           </a:p>
@@ -1831,7 +1831,7 @@
             <a:fld id="{B6F15528-21DE-4FAA-801E-634DDDAF4B2B}" type="slidenum">
               <a:rPr lang="en-US" smtClean="0"/>
               <a:pPr/>
-              <a:t>‹nº›</a:t>
+              <a:t>‹#›</a:t>
             </a:fld>
             <a:endParaRPr lang="en-US"/>
           </a:p>
@@ -1902,7 +1902,7 @@
             <a:fld id="{1D8BD707-D9CF-40AE-B4C6-C98DA3205C09}" type="datetimeFigureOut">
               <a:rPr lang="en-US" smtClean="0"/>
               <a:pPr/>
-              <a:t>11/25/2024</a:t>
+              <a:t>12/2/2024</a:t>
             </a:fld>
             <a:endParaRPr lang="en-US"/>
           </a:p>
@@ -1945,7 +1945,7 @@
             <a:fld id="{B6F15528-21DE-4FAA-801E-634DDDAF4B2B}" type="slidenum">
               <a:rPr lang="en-US" smtClean="0"/>
               <a:pPr/>
-              <a:t>‹nº›</a:t>
+              <a:t>‹#›</a:t>
             </a:fld>
             <a:endParaRPr lang="en-US"/>
           </a:p>
@@ -1994,7 +1994,7 @@
             <a:fld id="{1D8BD707-D9CF-40AE-B4C6-C98DA3205C09}" type="datetimeFigureOut">
               <a:rPr lang="en-US" smtClean="0"/>
               <a:pPr/>
-              <a:t>11/25/2024</a:t>
+              <a:t>12/2/2024</a:t>
             </a:fld>
             <a:endParaRPr lang="en-US"/>
           </a:p>
@@ -2037,7 +2037,7 @@
             <a:fld id="{B6F15528-21DE-4FAA-801E-634DDDAF4B2B}" type="slidenum">
               <a:rPr lang="en-US" smtClean="0"/>
               <a:pPr/>
-              <a:t>‹nº›</a:t>
+              <a:t>‹#›</a:t>
             </a:fld>
             <a:endParaRPr lang="en-US"/>
           </a:p>
@@ -2266,7 +2266,7 @@
             <a:fld id="{1D8BD707-D9CF-40AE-B4C6-C98DA3205C09}" type="datetimeFigureOut">
               <a:rPr lang="en-US" smtClean="0"/>
               <a:pPr/>
-              <a:t>11/25/2024</a:t>
+              <a:t>12/2/2024</a:t>
             </a:fld>
             <a:endParaRPr lang="en-US"/>
           </a:p>
@@ -2309,7 +2309,7 @@
             <a:fld id="{B6F15528-21DE-4FAA-801E-634DDDAF4B2B}" type="slidenum">
               <a:rPr lang="en-US" smtClean="0"/>
               <a:pPr/>
-              <a:t>‹nº›</a:t>
+              <a:t>‹#›</a:t>
             </a:fld>
             <a:endParaRPr lang="en-US"/>
           </a:p>
@@ -2515,7 +2515,7 @@
             <a:fld id="{1D8BD707-D9CF-40AE-B4C6-C98DA3205C09}" type="datetimeFigureOut">
               <a:rPr lang="en-US" smtClean="0"/>
               <a:pPr/>
-              <a:t>11/25/2024</a:t>
+              <a:t>12/2/2024</a:t>
             </a:fld>
             <a:endParaRPr lang="en-US"/>
           </a:p>
@@ -2558,7 +2558,7 @@
             <a:fld id="{B6F15528-21DE-4FAA-801E-634DDDAF4B2B}" type="slidenum">
               <a:rPr lang="en-US" smtClean="0"/>
               <a:pPr/>
-              <a:t>‹nº›</a:t>
+              <a:t>‹#›</a:t>
             </a:fld>
             <a:endParaRPr lang="en-US"/>
           </a:p>
@@ -2723,7 +2723,7 @@
             <a:fld id="{1D8BD707-D9CF-40AE-B4C6-C98DA3205C09}" type="datetimeFigureOut">
               <a:rPr lang="en-US" smtClean="0"/>
               <a:pPr/>
-              <a:t>11/25/2024</a:t>
+              <a:t>12/2/2024</a:t>
             </a:fld>
             <a:endParaRPr lang="en-US"/>
           </a:p>
@@ -2802,7 +2802,7 @@
             <a:fld id="{B6F15528-21DE-4FAA-801E-634DDDAF4B2B}" type="slidenum">
               <a:rPr lang="en-US" smtClean="0"/>
               <a:pPr/>
-              <a:t>‹nº›</a:t>
+              <a:t>‹#›</a:t>
             </a:fld>
             <a:endParaRPr lang="en-US"/>
           </a:p>
@@ -5192,29 +5192,7 @@
                 <a:ea typeface="Lato"/>
                 <a:cs typeface="Lato"/>
               </a:rPr>
-              <a:t> drawer do </a:t>
-            </a:r>
-            <a:r>
-              <a:rPr lang="en-US" sz="4000" spc="339" dirty="0" err="1">
-                <a:solidFill>
-                  <a:srgbClr val="000000"/>
-                </a:solidFill>
-                <a:latin typeface="Lato"/>
-                <a:ea typeface="Lato"/>
-                <a:cs typeface="Lato"/>
-              </a:rPr>
-              <a:t>Sacffold</a:t>
-            </a:r>
-            <a:r>
-              <a:rPr lang="en-US" sz="4000" spc="339" dirty="0">
-                <a:solidFill>
-                  <a:srgbClr val="000000"/>
-                </a:solidFill>
-                <a:latin typeface="Lato"/>
-                <a:ea typeface="Lato"/>
-                <a:cs typeface="Lato"/>
-              </a:rPr>
-              <a:t>;</a:t>
+              <a:t> drawer do Scaffold;</a:t>
             </a:r>
           </a:p>
           <a:p>

</xml_diff>